<commit_message>
Queued overview page themed
</commit_message>
<xml_diff>
--- a/submissions/week_ending_07-01-16/Quad Report Template - 2016-06-27.pptx
+++ b/submissions/week_ending_07-01-16/Quad Report Template - 2016-06-27.pptx
@@ -4281,7 +4281,7 @@
           <a:graphicData uri="http://schemas.openxmlformats.org/presentationml/2006/ole">
             <mc:AlternateContent xmlns:mc="http://schemas.openxmlformats.org/markup-compatibility/2006">
               <mc:Choice xmlns:v="urn:schemas-microsoft-com:vml" Requires="v">
-                <p:oleObj spid="_x0000_s1277" name="Document" r:id="rId4" imgW="2585160" imgH="5576828" progId="Word.Document.8">
+                <p:oleObj spid="_x0000_s1334" name="Document" r:id="rId4" imgW="2585160" imgH="5576828" progId="Word.Document.8">
                   <p:embed/>
                 </p:oleObj>
               </mc:Choice>
@@ -4324,14 +4324,14 @@
                       <a:effectLst/>
                       <a:extLst>
                         <a:ext uri="{909E8E84-426E-40dd-AFC4-6F175D3DCCD1}">
-                          <a14:hiddenFill xmlns:a14="http://schemas.microsoft.com/office/drawing/2010/main" xmlns="">
+                          <a14:hiddenFill xmlns="" xmlns:a14="http://schemas.microsoft.com/office/drawing/2010/main">
                             <a:solidFill>
                               <a:schemeClr val="accent1"/>
                             </a:solidFill>
                           </a14:hiddenFill>
                         </a:ext>
                         <a:ext uri="{91240B29-F687-4f45-9708-019B960494DF}">
-                          <a14:hiddenLine xmlns:a14="http://schemas.microsoft.com/office/drawing/2010/main" xmlns="" w="9525">
+                          <a14:hiddenLine xmlns="" xmlns:a14="http://schemas.microsoft.com/office/drawing/2010/main" w="9525">
                             <a:solidFill>
                               <a:schemeClr val="tx1"/>
                             </a:solidFill>
@@ -4341,7 +4341,7 @@
                           </a14:hiddenLine>
                         </a:ext>
                         <a:ext uri="{AF507438-7753-43e0-B8FC-AC1667EBCBE1}">
-                          <a14:hiddenEffects xmlns:a14="http://schemas.microsoft.com/office/drawing/2010/main" xmlns="">
+                          <a14:hiddenEffects xmlns="" xmlns:a14="http://schemas.microsoft.com/office/drawing/2010/main">
                             <a:effectLst>
                               <a:outerShdw blurRad="63500" dist="38099" dir="2700000" algn="ctr" rotWithShape="0">
                                 <a:schemeClr val="bg2">
@@ -4572,8 +4572,8 @@
         </p:nvSpPr>
         <p:spPr bwMode="auto">
           <a:xfrm>
-            <a:off x="2498725" y="350838"/>
-            <a:ext cx="2573092" cy="246197"/>
+            <a:off x="2498724" y="350838"/>
+            <a:ext cx="4125811" cy="338530"/>
           </a:xfrm>
           <a:prstGeom prst="rect">
             <a:avLst/>
@@ -4587,69 +4587,22 @@
           </a:ln>
         </p:spPr>
         <p:txBody>
-          <a:bodyPr wrap="none" lIns="91416" tIns="45708" rIns="91416" bIns="45708">
+          <a:bodyPr wrap="square" lIns="91416" tIns="45708" rIns="91416" bIns="45708">
             <a:spAutoFit/>
           </a:bodyPr>
           <a:lstStyle/>
           <a:p>
             <a:r>
-              <a:rPr lang="en-US" sz="1000" b="1" dirty="0" smtClean="0">
+              <a:rPr lang="en-US" sz="1600" b="1" dirty="0" smtClean="0">
                 <a:latin typeface="Arial" charset="0"/>
               </a:rPr>
               <a:t>PROJECT </a:t>
             </a:r>
             <a:r>
-              <a:rPr lang="en-US" sz="1000" b="1" dirty="0">
+              <a:rPr lang="en-US" sz="1600" b="1" dirty="0">
                 <a:latin typeface="Arial" charset="0"/>
               </a:rPr>
               <a:t>DELIVERABLES PROGRESS</a:t>
-            </a:r>
-          </a:p>
-        </p:txBody>
-      </p:sp>
-      <p:sp>
-        <p:nvSpPr>
-          <p:cNvPr id="1038" name="Text Box 9"/>
-          <p:cNvSpPr txBox="1">
-            <a:spLocks noChangeArrowheads="1"/>
-          </p:cNvSpPr>
-          <p:nvPr/>
-        </p:nvSpPr>
-        <p:spPr bwMode="auto">
-          <a:xfrm>
-            <a:off x="4986338" y="269760"/>
-            <a:ext cx="1428750" cy="247650"/>
-          </a:xfrm>
-          <a:prstGeom prst="rect">
-            <a:avLst/>
-          </a:prstGeom>
-          <a:noFill/>
-          <a:ln w="9525">
-            <a:solidFill>
-              <a:srgbClr val="000000"/>
-            </a:solidFill>
-            <a:miter lim="800000"/>
-            <a:headEnd/>
-            <a:tailEnd/>
-          </a:ln>
-        </p:spPr>
-        <p:txBody>
-          <a:bodyPr lIns="91416" tIns="45708" rIns="91416" bIns="45708"/>
-          <a:lstStyle/>
-          <a:p>
-            <a:r>
-              <a:rPr lang="en-US" sz="600">
-                <a:latin typeface="Arial" charset="0"/>
-              </a:rPr>
-              <a:t>C=Complete            IP=In Progress</a:t>
-            </a:r>
-          </a:p>
-          <a:p>
-            <a:r>
-              <a:rPr lang="en-US" sz="600" dirty="0">
-                <a:latin typeface="Arial" charset="0"/>
-              </a:rPr>
-              <a:t>NR=Not Required    NS=Not Started</a:t>
             </a:r>
           </a:p>
         </p:txBody>
@@ -4715,7 +4668,7 @@
           <a:graphicData uri="http://schemas.openxmlformats.org/presentationml/2006/ole">
             <mc:AlternateContent xmlns:mc="http://schemas.openxmlformats.org/markup-compatibility/2006">
               <mc:Choice xmlns:v="urn:schemas-microsoft-com:vml" Requires="v">
-                <p:oleObj spid="_x0000_s1278" name="Document" r:id="rId6" imgW="2794000" imgH="1181100" progId="Word.Document.8">
+                <p:oleObj spid="_x0000_s1335" name="Document" r:id="rId6" imgW="2794000" imgH="1181100" progId="Word.Document.8">
                   <p:embed/>
                 </p:oleObj>
               </mc:Choice>
@@ -4749,14 +4702,14 @@
                       <a:effectLst/>
                       <a:extLst>
                         <a:ext uri="{909E8E84-426E-40dd-AFC4-6F175D3DCCD1}">
-                          <a14:hiddenFill xmlns:a14="http://schemas.microsoft.com/office/drawing/2010/main" xmlns="">
+                          <a14:hiddenFill xmlns="" xmlns:a14="http://schemas.microsoft.com/office/drawing/2010/main">
                             <a:solidFill>
                               <a:srgbClr val="FFFFFF"/>
                             </a:solidFill>
                           </a14:hiddenFill>
                         </a:ext>
                         <a:ext uri="{AF507438-7753-43e0-B8FC-AC1667EBCBE1}">
-                          <a14:hiddenEffects xmlns:a14="http://schemas.microsoft.com/office/drawing/2010/main" xmlns="">
+                          <a14:hiddenEffects xmlns="" xmlns:a14="http://schemas.microsoft.com/office/drawing/2010/main">
                             <a:effectLst>
                               <a:outerShdw blurRad="63500" dist="38099" dir="2700000" algn="ctr" rotWithShape="0">
                                 <a:srgbClr val="000000">
@@ -4882,101 +4835,6 @@
           </a:p>
         </p:txBody>
       </p:sp>
-      <p:graphicFrame>
-        <p:nvGraphicFramePr>
-          <p:cNvPr id="1028" name="Object 17"/>
-          <p:cNvGraphicFramePr>
-            <a:graphicFrameLocks noChangeAspect="1"/>
-          </p:cNvGraphicFramePr>
-          <p:nvPr>
-            <p:extLst>
-              <p:ext uri="{D42A27DB-BD31-4B8C-83A1-F6EECF244321}">
-                <p14:modId xmlns:p14="http://schemas.microsoft.com/office/powerpoint/2010/main" val="1356192613"/>
-              </p:ext>
-            </p:extLst>
-          </p:nvPr>
-        </p:nvGraphicFramePr>
-        <p:xfrm>
-          <a:off x="2608263" y="539750"/>
-          <a:ext cx="4076700" cy="1220788"/>
-        </p:xfrm>
-        <a:graphic>
-          <a:graphicData uri="http://schemas.openxmlformats.org/presentationml/2006/ole">
-            <mc:AlternateContent xmlns:mc="http://schemas.openxmlformats.org/markup-compatibility/2006">
-              <mc:Choice xmlns:v="urn:schemas-microsoft-com:vml" Requires="v">
-                <p:oleObj spid="_x0000_s1279" name="Document" r:id="rId8" imgW="4965700" imgH="1485900" progId="Word.Document.8">
-                  <p:embed/>
-                </p:oleObj>
-              </mc:Choice>
-              <mc:Fallback>
-                <p:oleObj name="Document" r:id="rId8" imgW="4965700" imgH="1485900" progId="Word.Document.8">
-                  <p:embed/>
-                  <p:pic>
-                    <p:nvPicPr>
-                      <p:cNvPr id="0" name="Object 17"/>
-                      <p:cNvPicPr>
-                        <a:picLocks noChangeAspect="1" noChangeArrowheads="1"/>
-                      </p:cNvPicPr>
-                      <p:nvPr/>
-                    </p:nvPicPr>
-                    <p:blipFill>
-                      <a:blip r:embed="rId9"/>
-                      <a:srcRect/>
-                      <a:stretch>
-                        <a:fillRect/>
-                      </a:stretch>
-                    </p:blipFill>
-                    <p:spPr bwMode="auto">
-                      <a:xfrm>
-                        <a:off x="2608263" y="539750"/>
-                        <a:ext cx="4076700" cy="1220788"/>
-                      </a:xfrm>
-                      <a:prstGeom prst="rect">
-                        <a:avLst/>
-                      </a:prstGeom>
-                      <a:noFill/>
-                      <a:ln>
-                        <a:noFill/>
-                      </a:ln>
-                      <a:effectLst/>
-                      <a:extLst>
-                        <a:ext uri="{909E8E84-426E-40dd-AFC4-6F175D3DCCD1}">
-                          <a14:hiddenFill xmlns:a14="http://schemas.microsoft.com/office/drawing/2010/main" xmlns="">
-                            <a:solidFill>
-                              <a:schemeClr val="accent1"/>
-                            </a:solidFill>
-                          </a14:hiddenFill>
-                        </a:ext>
-                        <a:ext uri="{91240B29-F687-4f45-9708-019B960494DF}">
-                          <a14:hiddenLine xmlns:a14="http://schemas.microsoft.com/office/drawing/2010/main" xmlns="" w="9525">
-                            <a:solidFill>
-                              <a:schemeClr val="tx1"/>
-                            </a:solidFill>
-                            <a:miter lim="800000"/>
-                            <a:headEnd/>
-                            <a:tailEnd/>
-                          </a14:hiddenLine>
-                        </a:ext>
-                        <a:ext uri="{AF507438-7753-43e0-B8FC-AC1667EBCBE1}">
-                          <a14:hiddenEffects xmlns:a14="http://schemas.microsoft.com/office/drawing/2010/main" xmlns="">
-                            <a:effectLst>
-                              <a:outerShdw blurRad="63500" dist="38099" dir="2700000" algn="ctr" rotWithShape="0">
-                                <a:schemeClr val="bg2">
-                                  <a:alpha val="74997"/>
-                                </a:schemeClr>
-                              </a:outerShdw>
-                            </a:effectLst>
-                          </a14:hiddenEffects>
-                        </a:ext>
-                      </a:extLst>
-                    </p:spPr>
-                  </p:pic>
-                </p:oleObj>
-              </mc:Fallback>
-            </mc:AlternateContent>
-          </a:graphicData>
-        </a:graphic>
-      </p:graphicFrame>
       <p:sp>
         <p:nvSpPr>
           <p:cNvPr id="1044" name="Text Box 18"/>
@@ -5129,7 +4987,7 @@
         <p:spPr bwMode="auto">
           <a:xfrm>
             <a:off x="0" y="2171700"/>
-            <a:ext cx="4662488" cy="1815866"/>
+            <a:ext cx="4662488" cy="1569644"/>
           </a:xfrm>
           <a:prstGeom prst="rect">
             <a:avLst/>
@@ -5199,9 +5057,6 @@
               </a:rPr>
               <a:t>Dashboard developed to give overview of project, issues, and chat</a:t>
             </a:r>
-            <a:endParaRPr lang="en-GB" sz="800" dirty="0" smtClean="0">
-              <a:latin typeface="Arial" charset="0"/>
-            </a:endParaRPr>
           </a:p>
           <a:p>
             <a:pPr marL="107950" indent="-107950">
@@ -5212,7 +5067,7 @@
               <a:rPr lang="en-GB" sz="800" dirty="0" smtClean="0">
                 <a:latin typeface="Arial" charset="0"/>
               </a:rPr>
-              <a:t>Queued allows for dragging and dropping of stories from one status to another</a:t>
+              <a:t>Queued allows for dragging and dropping of stories from one state to another</a:t>
             </a:r>
           </a:p>
           <a:p>
@@ -5221,14 +5076,11 @@
               <a:buChar char="ü"/>
             </a:pPr>
             <a:r>
-              <a:rPr lang="en-GB" sz="800" smtClean="0">
+              <a:rPr lang="en-GB" sz="800" dirty="0" smtClean="0">
                 <a:latin typeface="Arial" charset="0"/>
               </a:rPr>
-              <a:t>Queued </a:t>
-            </a:r>
-            <a:endParaRPr lang="en-GB" sz="800" dirty="0" smtClean="0">
-              <a:latin typeface="Arial" charset="0"/>
-            </a:endParaRPr>
+              <a:t>Queued displays priority in overview</a:t>
+            </a:r>
           </a:p>
           <a:p>
             <a:pPr marL="107950" indent="-107950">
@@ -5247,9 +5099,6 @@
               </a:rPr>
               <a:t> displays online users</a:t>
             </a:r>
-            <a:endParaRPr lang="en-GB" sz="800" dirty="0" smtClean="0">
-              <a:latin typeface="Arial" charset="0"/>
-            </a:endParaRPr>
           </a:p>
           <a:p>
             <a:pPr marL="107950" indent="-107950">
@@ -5266,17 +5115,8 @@
               <a:rPr lang="en-GB" sz="800" dirty="0" smtClean="0">
                 <a:latin typeface="Arial" charset="0"/>
               </a:rPr>
-              <a:t> </a:t>
-            </a:r>
-            <a:r>
-              <a:rPr lang="en-GB" sz="800" dirty="0" smtClean="0">
-                <a:latin typeface="Arial" charset="0"/>
-              </a:rPr>
-              <a:t>displays </a:t>
-            </a:r>
-            <a:endParaRPr lang="en-GB" sz="800" dirty="0" smtClean="0">
-              <a:latin typeface="Arial" charset="0"/>
-            </a:endParaRPr>
+              <a:t> displays time and date progression of messages</a:t>
+            </a:r>
           </a:p>
           <a:p>
             <a:pPr marL="107950" indent="-107950">
@@ -5284,10 +5124,16 @@
               <a:buChar char="ü"/>
             </a:pPr>
             <a:r>
+              <a:rPr lang="en-GB" sz="800" dirty="0" err="1" smtClean="0">
+                <a:latin typeface="Arial" charset="0"/>
+              </a:rPr>
+              <a:t>ChatNow</a:t>
+            </a:r>
+            <a:r>
               <a:rPr lang="en-GB" sz="800" dirty="0" smtClean="0">
                 <a:latin typeface="Arial" charset="0"/>
               </a:rPr>
-              <a:t>Bugs added support for attaching screenshots to issue</a:t>
+              <a:t> allows basic message search</a:t>
             </a:r>
           </a:p>
           <a:p>
@@ -5299,7 +5145,7 @@
               <a:rPr lang="en-GB" sz="800" dirty="0" smtClean="0">
                 <a:latin typeface="Arial" charset="0"/>
               </a:rPr>
-              <a:t>Queued updated to reflect multiple stages of a project</a:t>
+              <a:t>Bugs supports Markdown in issue creation</a:t>
             </a:r>
           </a:p>
           <a:p>
@@ -5308,26 +5154,11 @@
               <a:buChar char="ü"/>
             </a:pPr>
             <a:r>
-              <a:rPr lang="en-US" sz="800" dirty="0" smtClean="0">
+              <a:rPr lang="en-GB" sz="800" dirty="0" smtClean="0">
                 <a:latin typeface="Arial" charset="0"/>
               </a:rPr>
-              <a:t>Unit </a:t>
-            </a:r>
-            <a:r>
-              <a:rPr lang="en-US" sz="800" dirty="0">
-                <a:latin typeface="Arial" charset="0"/>
-              </a:rPr>
-              <a:t>Testing framework Mocha </a:t>
-            </a:r>
-            <a:r>
-              <a:rPr lang="en-US" sz="800" dirty="0" smtClean="0">
-                <a:latin typeface="Arial" charset="0"/>
-              </a:rPr>
-              <a:t>selected for project, initial tests being written</a:t>
-            </a:r>
-            <a:endParaRPr lang="en-GB" sz="800" dirty="0" smtClean="0">
-              <a:latin typeface="Arial" charset="0"/>
-            </a:endParaRPr>
+              <a:t>Bugs supports comments and screenshots</a:t>
+            </a:r>
           </a:p>
           <a:p>
             <a:pPr marL="107950" indent="-107950">
@@ -5335,10 +5166,10 @@
               <a:buChar char="ü"/>
             </a:pPr>
             <a:r>
-              <a:rPr lang="en-US" sz="800" dirty="0" smtClean="0">
+              <a:rPr lang="en-GB" sz="800" dirty="0" smtClean="0">
                 <a:latin typeface="Arial" charset="0"/>
               </a:rPr>
-              <a:t>Documentation of elements from Iteration 1 are underway and new items will be documented on an ongoing basis</a:t>
+              <a:t>Bugs implemented new design for overview page</a:t>
             </a:r>
           </a:p>
           <a:p>
@@ -5350,19 +5181,7 @@
               <a:rPr lang="en-US" sz="800" dirty="0" smtClean="0">
                 <a:latin typeface="Arial" charset="0"/>
               </a:rPr>
-              <a:t>Database table names standardized, organized under sub-project name</a:t>
-            </a:r>
-          </a:p>
-          <a:p>
-            <a:pPr marL="107950" indent="-107950">
-              <a:buFont typeface="Wingdings" pitchFamily="2" charset="2"/>
-              <a:buChar char="ü"/>
-            </a:pPr>
-            <a:r>
-              <a:rPr lang="en-US" sz="800" dirty="0" smtClean="0">
-                <a:latin typeface="Arial" charset="0"/>
-              </a:rPr>
-              <a:t>Trello updated with user stories for Iteration 2</a:t>
+              <a:t>Routes for Bugs was organized to follow a more RESTful approach</a:t>
             </a:r>
           </a:p>
           <a:p>
@@ -5398,12 +5217,12 @@
           <a:graphicData uri="http://schemas.openxmlformats.org/presentationml/2006/ole">
             <mc:AlternateContent xmlns:mc="http://schemas.openxmlformats.org/markup-compatibility/2006">
               <mc:Choice xmlns:v="urn:schemas-microsoft-com:vml" Requires="v">
-                <p:oleObj spid="_x0000_s1280" name="Document" r:id="rId10" imgW="4432300" imgH="2197100" progId="Word.Document.8">
+                <p:oleObj spid="_x0000_s1336" name="Document" r:id="rId8" imgW="4432300" imgH="2197100" progId="Word.Document.8">
                   <p:embed/>
                 </p:oleObj>
               </mc:Choice>
               <mc:Fallback>
-                <p:oleObj name="Document" r:id="rId10" imgW="4432300" imgH="2197100" progId="Word.Document.8">
+                <p:oleObj name="Document" r:id="rId8" imgW="4432300" imgH="2197100" progId="Word.Document.8">
                   <p:embed/>
                   <p:pic>
                     <p:nvPicPr>
@@ -5414,7 +5233,7 @@
                       <p:nvPr/>
                     </p:nvPicPr>
                     <p:blipFill>
-                      <a:blip r:embed="rId11"/>
+                      <a:blip r:embed="rId9"/>
                       <a:srcRect/>
                       <a:stretch>
                         <a:fillRect/>
@@ -5431,7 +5250,7 @@
                       <a:noFill/>
                       <a:extLst>
                         <a:ext uri="{909E8E84-426E-40dd-AFC4-6F175D3DCCD1}">
-                          <a14:hiddenFill xmlns:a14="http://schemas.microsoft.com/office/drawing/2010/main" xmlns="">
+                          <a14:hiddenFill xmlns="" xmlns:a14="http://schemas.microsoft.com/office/drawing/2010/main">
                             <a:solidFill>
                               <a:srgbClr val="FFFFFF"/>
                             </a:solidFill>
@@ -5457,7 +5276,7 @@
         <p:spPr bwMode="auto">
           <a:xfrm>
             <a:off x="0" y="4912095"/>
-            <a:ext cx="4340225" cy="1138757"/>
+            <a:ext cx="4340225" cy="769425"/>
           </a:xfrm>
           <a:prstGeom prst="rect">
             <a:avLst/>
@@ -5503,28 +5322,10 @@
               <a:buChar char="ü"/>
             </a:pPr>
             <a:r>
-              <a:rPr lang="en-US" sz="800" b="1" dirty="0">
-                <a:latin typeface="Arial" charset="0"/>
-              </a:rPr>
-              <a:t>Unit Testing framework Mocha and </a:t>
-            </a:r>
-            <a:r>
               <a:rPr lang="en-US" sz="800" b="1" dirty="0" smtClean="0">
                 <a:latin typeface="Arial" charset="0"/>
               </a:rPr>
-              <a:t>Selenium selected </a:t>
-            </a:r>
-            <a:r>
-              <a:rPr lang="en-US" sz="800" b="1" dirty="0">
-                <a:latin typeface="Arial" charset="0"/>
-              </a:rPr>
-              <a:t>for </a:t>
-            </a:r>
-            <a:r>
-              <a:rPr lang="en-US" sz="800" b="1" dirty="0" smtClean="0">
-                <a:latin typeface="Arial" charset="0"/>
-              </a:rPr>
-              <a:t>project</a:t>
+              <a:t>Dashboard will be used to provide overview of projects</a:t>
             </a:r>
           </a:p>
           <a:p>
@@ -5539,7 +5340,7 @@
               <a:rPr lang="en-US" sz="800" b="1" dirty="0" smtClean="0">
                 <a:latin typeface="Arial" charset="0"/>
               </a:rPr>
-              <a:t>Data will be stored in extended character set to allow non-Latin alphabets</a:t>
+              <a:t>Routes will be standardized</a:t>
             </a:r>
           </a:p>
           <a:p>
@@ -5554,43 +5355,7 @@
               <a:rPr lang="en-US" sz="800" b="1" dirty="0" smtClean="0">
                 <a:latin typeface="Arial" charset="0"/>
               </a:rPr>
-              <a:t>Added assumption that all users of the system are trusted, can perform any action</a:t>
-            </a:r>
-          </a:p>
-          <a:p>
-            <a:pPr marL="107950" indent="-107950">
-              <a:spcBef>
-                <a:spcPct val="50000"/>
-              </a:spcBef>
-              <a:buFont typeface="Wingdings" pitchFamily="2" charset="2"/>
-              <a:buChar char="ü"/>
-            </a:pPr>
-            <a:r>
-              <a:rPr lang="en-US" sz="800" b="1" dirty="0">
-                <a:latin typeface="Arial" charset="0"/>
-              </a:rPr>
-              <a:t>Code Review is being coordinated through </a:t>
-            </a:r>
-            <a:r>
-              <a:rPr lang="en-US" sz="800" b="1" dirty="0" smtClean="0">
-                <a:latin typeface="Arial" charset="0"/>
-              </a:rPr>
-              <a:t>Trello</a:t>
-            </a:r>
-          </a:p>
-          <a:p>
-            <a:pPr marL="107950" indent="-107950">
-              <a:spcBef>
-                <a:spcPct val="50000"/>
-              </a:spcBef>
-              <a:buFont typeface="Wingdings" pitchFamily="2" charset="2"/>
-              <a:buChar char="ü"/>
-            </a:pPr>
-            <a:r>
-              <a:rPr lang="en-US" sz="800" b="1" dirty="0" smtClean="0">
-                <a:latin typeface="Arial" charset="0"/>
-              </a:rPr>
-              <a:t>Architect for each components changed over for Iteration 2</a:t>
+              <a:t>Email notifications can be edited in the status</a:t>
             </a:r>
           </a:p>
         </p:txBody>
@@ -5617,12 +5382,12 @@
           <a:graphicData uri="http://schemas.openxmlformats.org/presentationml/2006/ole">
             <mc:AlternateContent xmlns:mc="http://schemas.openxmlformats.org/markup-compatibility/2006">
               <mc:Choice xmlns:v="urn:schemas-microsoft-com:vml" Requires="v">
-                <p:oleObj spid="_x0000_s1281" name="Document" r:id="rId12" imgW="4406900" imgH="1447800" progId="Word.Document.8">
+                <p:oleObj spid="_x0000_s1337" name="Document" r:id="rId10" imgW="4406900" imgH="1447800" progId="Word.Document.8">
                   <p:embed/>
                 </p:oleObj>
               </mc:Choice>
               <mc:Fallback>
-                <p:oleObj name="Document" r:id="rId12" imgW="4406900" imgH="1447800" progId="Word.Document.8">
+                <p:oleObj name="Document" r:id="rId10" imgW="4406900" imgH="1447800" progId="Word.Document.8">
                   <p:embed/>
                   <p:pic>
                     <p:nvPicPr>
@@ -5633,7 +5398,7 @@
                       <p:nvPr/>
                     </p:nvPicPr>
                     <p:blipFill>
-                      <a:blip r:embed="rId13"/>
+                      <a:blip r:embed="rId11"/>
                       <a:srcRect/>
                       <a:stretch>
                         <a:fillRect/>
@@ -5650,7 +5415,7 @@
                       <a:noFill/>
                       <a:extLst>
                         <a:ext uri="{909E8E84-426E-40dd-AFC4-6F175D3DCCD1}">
-                          <a14:hiddenFill xmlns:a14="http://schemas.microsoft.com/office/drawing/2010/main" xmlns="">
+                          <a14:hiddenFill xmlns="" xmlns:a14="http://schemas.microsoft.com/office/drawing/2010/main">
                             <a:solidFill>
                               <a:srgbClr val="FFFFFF"/>
                             </a:solidFill>
@@ -5676,7 +5441,7 @@
         <p:spPr bwMode="auto">
           <a:xfrm>
             <a:off x="24606" y="6119294"/>
-            <a:ext cx="4338638" cy="702884"/>
+            <a:ext cx="4338638" cy="395107"/>
           </a:xfrm>
           <a:prstGeom prst="rect">
             <a:avLst/>
@@ -5721,23 +5486,21 @@
                 <a:latin typeface="Arial" pitchFamily="34" charset="0"/>
                 <a:cs typeface="Arial" pitchFamily="34" charset="0"/>
               </a:rPr>
-              <a:t>David Blair has taken over as Project Manager</a:t>
-            </a:r>
-          </a:p>
-          <a:p>
-            <a:pPr defTabSz="865188">
-              <a:spcBef>
-                <a:spcPct val="50000"/>
-              </a:spcBef>
-              <a:buFont typeface="Wingdings" pitchFamily="2" charset="2"/>
-              <a:buChar char="ü"/>
-            </a:pPr>
+              <a:t>Iteration code freeze will occur on July 6</a:t>
+            </a:r>
+            <a:r>
+              <a:rPr lang="en-US" sz="800" baseline="30000" dirty="0" smtClean="0">
+                <a:latin typeface="Arial" pitchFamily="34" charset="0"/>
+                <a:cs typeface="Arial" pitchFamily="34" charset="0"/>
+              </a:rPr>
+              <a:t>th</a:t>
+            </a:r>
             <a:r>
               <a:rPr lang="en-US" sz="800" dirty="0" smtClean="0">
                 <a:latin typeface="Arial" pitchFamily="34" charset="0"/>
                 <a:cs typeface="Arial" pitchFamily="34" charset="0"/>
               </a:rPr>
-              <a:t> Development progress can be seen in develop branch on GitHub, master branch only updated for releases.</a:t>
+              <a:t> for deployment to the production server </a:t>
             </a:r>
           </a:p>
         </p:txBody>
@@ -6237,7 +6000,7 @@
         <a:effectLst/>
         <a:extLst>
           <a:ext uri="{AF507438-7753-43e0-B8FC-AC1667EBCBE1}">
-            <a14:hiddenEffects xmlns:a14="http://schemas.microsoft.com/office/drawing/2010/main" xmlns="">
+            <a14:hiddenEffects xmlns="" xmlns:a14="http://schemas.microsoft.com/office/drawing/2010/main">
               <a:effectLst>
                 <a:outerShdw blurRad="63500" dist="38099" dir="2700000" algn="ctr" rotWithShape="0">
                   <a:schemeClr val="bg2">
@@ -6313,7 +6076,7 @@
         <a:effectLst/>
         <a:extLst>
           <a:ext uri="{AF507438-7753-43e0-B8FC-AC1667EBCBE1}">
-            <a14:hiddenEffects xmlns:a14="http://schemas.microsoft.com/office/drawing/2010/main" xmlns="">
+            <a14:hiddenEffects xmlns="" xmlns:a14="http://schemas.microsoft.com/office/drawing/2010/main">
               <a:effectLst>
                 <a:outerShdw blurRad="63500" dist="38099" dir="2700000" algn="ctr" rotWithShape="0">
                   <a:schemeClr val="bg2">

</xml_diff>